<commit_message>
Fixing arrests -> convictions
</commit_message>
<xml_diff>
--- a/SPSA (Working).pptx
+++ b/SPSA (Working).pptx
@@ -315,7 +315,7 @@
               <a:pPr>
                 <a:defRPr/>
               </a:pPr>
-              <a:t>1/14/19</a:t>
+              <a:t>1/16/19</a:t>
             </a:fld>
             <a:endParaRPr lang="en-US"/>
           </a:p>
@@ -929,6 +929,96 @@
           <a:bodyPr/>
           <a:lstStyle/>
           <a:p>
+            <a:endParaRPr lang="en-US" dirty="0"/>
+          </a:p>
+        </p:txBody>
+      </p:sp>
+      <p:sp>
+        <p:nvSpPr>
+          <p:cNvPr id="4" name="Slide Number Placeholder 3"/>
+          <p:cNvSpPr>
+            <a:spLocks noGrp="1"/>
+          </p:cNvSpPr>
+          <p:nvPr>
+            <p:ph type="sldNum" sz="quarter" idx="5"/>
+          </p:nvPr>
+        </p:nvSpPr>
+        <p:spPr/>
+        <p:txBody>
+          <a:bodyPr/>
+          <a:lstStyle/>
+          <a:p>
+            <a:pPr>
+              <a:defRPr/>
+            </a:pPr>
+            <a:fld id="{6E074355-CE0D-4C68-A6CB-C364ED71B33B}" type="slidenum">
+              <a:rPr lang="en-US" smtClean="0"/>
+              <a:pPr>
+                <a:defRPr/>
+              </a:pPr>
+              <a:t>4</a:t>
+            </a:fld>
+            <a:endParaRPr lang="en-US"/>
+          </a:p>
+        </p:txBody>
+      </p:sp>
+    </p:spTree>
+    <p:extLst>
+      <p:ext uri="{BB962C8B-B14F-4D97-AF65-F5344CB8AC3E}">
+        <p14:creationId xmlns:p14="http://schemas.microsoft.com/office/powerpoint/2010/main" val="1679803652"/>
+      </p:ext>
+    </p:extLst>
+  </p:cSld>
+  <p:clrMapOvr>
+    <a:masterClrMapping/>
+  </p:clrMapOvr>
+</p:notes>
+</file>
+
+<file path=ppt/notesSlides/notesSlide4.xml><?xml version="1.0" encoding="utf-8"?>
+<p:notes xmlns:a="http://schemas.openxmlformats.org/drawingml/2006/main" xmlns:r="http://schemas.openxmlformats.org/officeDocument/2006/relationships" xmlns:p="http://schemas.openxmlformats.org/presentationml/2006/main">
+  <p:cSld>
+    <p:spTree>
+      <p:nvGrpSpPr>
+        <p:cNvPr id="1" name=""/>
+        <p:cNvGrpSpPr/>
+        <p:nvPr/>
+      </p:nvGrpSpPr>
+      <p:grpSpPr>
+        <a:xfrm>
+          <a:off x="0" y="0"/>
+          <a:ext cx="0" cy="0"/>
+          <a:chOff x="0" y="0"/>
+          <a:chExt cx="0" cy="0"/>
+        </a:xfrm>
+      </p:grpSpPr>
+      <p:sp>
+        <p:nvSpPr>
+          <p:cNvPr id="2" name="Slide Image Placeholder 1"/>
+          <p:cNvSpPr>
+            <a:spLocks noGrp="1" noRot="1" noChangeAspect="1"/>
+          </p:cNvSpPr>
+          <p:nvPr>
+            <p:ph type="sldImg"/>
+          </p:nvPr>
+        </p:nvSpPr>
+        <p:spPr/>
+      </p:sp>
+      <p:sp>
+        <p:nvSpPr>
+          <p:cNvPr id="3" name="Notes Placeholder 2"/>
+          <p:cNvSpPr>
+            <a:spLocks noGrp="1"/>
+          </p:cNvSpPr>
+          <p:nvPr>
+            <p:ph type="body" idx="1"/>
+          </p:nvPr>
+        </p:nvSpPr>
+        <p:spPr/>
+        <p:txBody>
+          <a:bodyPr/>
+          <a:lstStyle/>
+          <a:p>
             <a:r>
               <a:rPr lang="en-US" dirty="0"/>
               <a:t>Mark, see this http://</a:t>
@@ -999,7 +1089,7 @@
 </p:notes>
 </file>
 
-<file path=ppt/notesSlides/notesSlide4.xml><?xml version="1.0" encoding="utf-8"?>
+<file path=ppt/notesSlides/notesSlide5.xml><?xml version="1.0" encoding="utf-8"?>
 <p:notes xmlns:a="http://schemas.openxmlformats.org/drawingml/2006/main" xmlns:r="http://schemas.openxmlformats.org/officeDocument/2006/relationships" xmlns:p="http://schemas.openxmlformats.org/presentationml/2006/main">
   <p:cSld>
     <p:spTree>
@@ -7446,27 +7536,104 @@
             <p:ph idx="1"/>
           </p:nvPr>
         </p:nvSpPr>
-        <p:spPr/>
+        <p:spPr>
+          <a:xfrm>
+            <a:off x="457200" y="1771650"/>
+            <a:ext cx="8153400" cy="2914650"/>
+          </a:xfrm>
+        </p:spPr>
         <p:txBody>
-          <a:bodyPr/>
+          <a:bodyPr>
+            <a:normAutofit lnSpcReduction="10000"/>
+          </a:bodyPr>
           <a:lstStyle/>
           <a:p>
             <a:r>
-              <a:rPr lang="en-US" dirty="0"/>
-              <a:t>On campaign finance (Barber 2016)</a:t>
-            </a:r>
-          </a:p>
-          <a:p>
-            <a:r>
-              <a:rPr lang="en-US" dirty="0"/>
-              <a:t>On corruption (Alt and Lassen 2006) </a:t>
-            </a:r>
-          </a:p>
-          <a:p>
-            <a:r>
-              <a:rPr lang="en-US" dirty="0"/>
-              <a:t>On state-level comparative work (Barber 2016) </a:t>
-            </a:r>
+              <a:rPr lang="en-US" b="1" dirty="0"/>
+              <a:t>On state level campaign finance:</a:t>
+            </a:r>
+            <a:r>
+              <a:rPr lang="en-US" dirty="0"/>
+              <a:t> </a:t>
+            </a:r>
+          </a:p>
+          <a:p>
+            <a:pPr lvl="1"/>
+            <a:r>
+              <a:rPr lang="en-US" dirty="0"/>
+              <a:t>Barber 2016, Hamm and Hogan 2008; Primo and </a:t>
+            </a:r>
+            <a:r>
+              <a:rPr lang="en-US" dirty="0" err="1"/>
+              <a:t>Milyo</a:t>
+            </a:r>
+            <a:r>
+              <a:rPr lang="en-US" dirty="0"/>
+              <a:t> 2006 </a:t>
+            </a:r>
+          </a:p>
+          <a:p>
+            <a:r>
+              <a:rPr lang="en-US" b="1" dirty="0"/>
+              <a:t>On state level corruption:</a:t>
+            </a:r>
+            <a:r>
+              <a:rPr lang="en-US" dirty="0"/>
+              <a:t> </a:t>
+            </a:r>
+          </a:p>
+          <a:p>
+            <a:pPr lvl="1"/>
+            <a:r>
+              <a:rPr lang="en-US" dirty="0"/>
+              <a:t>Alt and Lassen 2006, Walker and Calcagno 2011, Liu &amp; Mikesell 2014, </a:t>
+            </a:r>
+            <a:r>
+              <a:rPr lang="en-US" dirty="0" err="1"/>
+              <a:t>Glaeser</a:t>
+            </a:r>
+            <a:r>
+              <a:rPr lang="en-US" dirty="0"/>
+              <a:t> and Saks 2006, Crider and </a:t>
+            </a:r>
+            <a:r>
+              <a:rPr lang="en-US" dirty="0" err="1"/>
+              <a:t>Milyo</a:t>
+            </a:r>
+            <a:r>
+              <a:rPr lang="en-US" dirty="0"/>
+              <a:t> 2013, Boylan and Long 2003, </a:t>
+            </a:r>
+            <a:r>
+              <a:rPr lang="en-US" dirty="0" err="1"/>
+              <a:t>Dincer</a:t>
+            </a:r>
+            <a:r>
+              <a:rPr lang="en-US" dirty="0"/>
+              <a:t> 2018 </a:t>
+            </a:r>
+          </a:p>
+          <a:p>
+            <a:r>
+              <a:rPr lang="en-US" b="1" dirty="0"/>
+              <a:t>On state level campaign finance and corruption</a:t>
+            </a:r>
+          </a:p>
+          <a:p>
+            <a:pPr lvl="1"/>
+            <a:r>
+              <a:rPr lang="en-US" dirty="0"/>
+              <a:t>Cordis and </a:t>
+            </a:r>
+            <a:r>
+              <a:rPr lang="en-US" dirty="0" err="1"/>
+              <a:t>Milyo</a:t>
+            </a:r>
+            <a:r>
+              <a:rPr lang="en-US" dirty="0"/>
+              <a:t> 2013 </a:t>
+            </a:r>
+            <a:endParaRPr lang="en-US" b="1" dirty="0"/>
           </a:p>
         </p:txBody>
       </p:sp>

</xml_diff>